<commit_message>
Finished the presentation 1
</commit_message>
<xml_diff>
--- a/Documents/Presentation1.pptx
+++ b/Documents/Presentation1.pptx
@@ -10825,7 +10825,6 @@
               <a:rPr lang="fr-CH" sz="3600" dirty="0"/>
               <a:t>Jeu de rythme</a:t>
             </a:r>
-            <a:endParaRPr lang="fr-CH" sz="3600" dirty="0"/>
           </a:p>
         </p:txBody>
       </p:sp>
@@ -10976,37 +10975,36 @@
           </a:p>
         </p:txBody>
       </p:sp>
-      <p:sp>
-        <p:nvSpPr>
-          <p:cNvPr id="6" name="Espace réservé du contenu 5"/>
-          <p:cNvSpPr>
-            <a:spLocks noGrp="1"/>
-          </p:cNvSpPr>
-          <p:nvPr>
-            <p:ph idx="1"/>
-          </p:nvPr>
-        </p:nvSpPr>
-        <p:spPr/>
-        <p:txBody>
-          <a:bodyPr/>
-          <a:lstStyle/>
-          <a:p>
-            <a:r>
-              <a:rPr lang="fr-CH" dirty="0" smtClean="0">
-                <a:solidFill>
-                  <a:srgbClr val="FF0000"/>
-                </a:solidFill>
-              </a:rPr>
-              <a:t>SCREENSHOT</a:t>
-            </a:r>
-            <a:endParaRPr lang="fr-CH" dirty="0">
-              <a:solidFill>
-                <a:srgbClr val="FF0000"/>
-              </a:solidFill>
-            </a:endParaRPr>
-          </a:p>
-        </p:txBody>
-      </p:sp>
+      <p:pic>
+        <p:nvPicPr>
+          <p:cNvPr id="3" name="Image 2"/>
+          <p:cNvPicPr>
+            <a:picLocks noChangeAspect="1"/>
+          </p:cNvPicPr>
+          <p:nvPr/>
+        </p:nvPicPr>
+        <p:blipFill>
+          <a:blip r:embed="rId2">
+            <a:extLst>
+              <a:ext uri="{28A0092B-C50C-407E-A947-70E740481C1C}">
+                <a14:useLocalDpi xmlns:a14="http://schemas.microsoft.com/office/drawing/2010/main" val="0"/>
+              </a:ext>
+            </a:extLst>
+          </a:blip>
+          <a:stretch>
+            <a:fillRect/>
+          </a:stretch>
+        </p:blipFill>
+        <p:spPr>
+          <a:xfrm>
+            <a:off x="1801694" y="1800289"/>
+            <a:ext cx="7877765" cy="4433078"/>
+          </a:xfrm>
+          <a:prstGeom prst="rect">
+            <a:avLst/>
+          </a:prstGeom>
+        </p:spPr>
+      </p:pic>
     </p:spTree>
     <p:extLst>
       <p:ext uri="{BB962C8B-B14F-4D97-AF65-F5344CB8AC3E}">
@@ -11096,7 +11094,7 @@
         </p:nvSpPr>
         <p:spPr>
           <a:xfrm>
-            <a:off x="2380736" y="3398472"/>
+            <a:off x="2397212" y="4262898"/>
             <a:ext cx="2744919" cy="461665"/>
           </a:xfrm>
           <a:prstGeom prst="rect">
@@ -11126,7 +11124,7 @@
         </p:nvSpPr>
         <p:spPr>
           <a:xfrm>
-            <a:off x="6981567" y="3398472"/>
+            <a:off x="6998043" y="4262898"/>
             <a:ext cx="1935273" cy="461665"/>
           </a:xfrm>
           <a:prstGeom prst="rect">
@@ -11148,6 +11146,169 @@
           </a:p>
         </p:txBody>
       </p:sp>
+      <p:pic>
+        <p:nvPicPr>
+          <p:cNvPr id="3" name="Image 2"/>
+          <p:cNvPicPr>
+            <a:picLocks noChangeAspect="1"/>
+          </p:cNvPicPr>
+          <p:nvPr/>
+        </p:nvPicPr>
+        <p:blipFill>
+          <a:blip r:embed="rId2"/>
+          <a:stretch>
+            <a:fillRect/>
+          </a:stretch>
+        </p:blipFill>
+        <p:spPr>
+          <a:xfrm>
+            <a:off x="2498083" y="3206860"/>
+            <a:ext cx="2543175" cy="476250"/>
+          </a:xfrm>
+          <a:prstGeom prst="rect">
+            <a:avLst/>
+          </a:prstGeom>
+        </p:spPr>
+      </p:pic>
+      <p:grpSp>
+        <p:nvGrpSpPr>
+          <p:cNvPr id="14" name="Groupe 13"/>
+          <p:cNvGrpSpPr/>
+          <p:nvPr/>
+        </p:nvGrpSpPr>
+        <p:grpSpPr>
+          <a:xfrm>
+            <a:off x="7343722" y="2825472"/>
+            <a:ext cx="1243914" cy="1191356"/>
+            <a:chOff x="7422291" y="2226276"/>
+            <a:chExt cx="873211" cy="864973"/>
+          </a:xfrm>
+        </p:grpSpPr>
+        <p:pic>
+          <p:nvPicPr>
+            <p:cNvPr id="7" name="Image 6"/>
+            <p:cNvPicPr>
+              <a:picLocks noChangeAspect="1"/>
+            </p:cNvPicPr>
+            <p:nvPr/>
+          </p:nvPicPr>
+          <p:blipFill rotWithShape="1">
+            <a:blip r:embed="rId3"/>
+            <a:srcRect l="7588" t="12666" r="7527" b="10376"/>
+            <a:stretch/>
+          </p:blipFill>
+          <p:spPr>
+            <a:xfrm>
+              <a:off x="7422291" y="2226276"/>
+              <a:ext cx="873211" cy="864973"/>
+            </a:xfrm>
+            <a:prstGeom prst="rect">
+              <a:avLst/>
+            </a:prstGeom>
+          </p:spPr>
+        </p:pic>
+        <p:sp>
+          <p:nvSpPr>
+            <p:cNvPr id="8" name="Ellipse 7"/>
+            <p:cNvSpPr/>
+            <p:nvPr/>
+          </p:nvSpPr>
+          <p:spPr>
+            <a:xfrm>
+              <a:off x="7659642" y="2457450"/>
+              <a:ext cx="398508" cy="391506"/>
+            </a:xfrm>
+            <a:prstGeom prst="ellipse">
+              <a:avLst/>
+            </a:prstGeom>
+            <a:solidFill>
+              <a:srgbClr val="FF0000">
+                <a:alpha val="50196"/>
+              </a:srgbClr>
+            </a:solidFill>
+            <a:ln>
+              <a:noFill/>
+            </a:ln>
+          </p:spPr>
+          <p:style>
+            <a:lnRef idx="2">
+              <a:schemeClr val="accent1">
+                <a:shade val="50000"/>
+              </a:schemeClr>
+            </a:lnRef>
+            <a:fillRef idx="1">
+              <a:schemeClr val="accent1"/>
+            </a:fillRef>
+            <a:effectRef idx="0">
+              <a:schemeClr val="accent1"/>
+            </a:effectRef>
+            <a:fontRef idx="minor">
+              <a:schemeClr val="lt1"/>
+            </a:fontRef>
+          </p:style>
+          <p:txBody>
+            <a:bodyPr rtlCol="0" anchor="ctr"/>
+            <a:lstStyle/>
+            <a:p>
+              <a:pPr algn="ctr"/>
+              <a:endParaRPr lang="fr-CH"/>
+            </a:p>
+          </p:txBody>
+        </p:sp>
+        <p:sp>
+          <p:nvSpPr>
+            <p:cNvPr id="10" name="Bouée 9"/>
+            <p:cNvSpPr/>
+            <p:nvPr/>
+          </p:nvSpPr>
+          <p:spPr>
+            <a:xfrm>
+              <a:off x="7497331" y="2281483"/>
+              <a:ext cx="723129" cy="743439"/>
+            </a:xfrm>
+            <a:prstGeom prst="donut">
+              <a:avLst/>
+            </a:prstGeom>
+            <a:solidFill>
+              <a:schemeClr val="accent1">
+                <a:lumMod val="75000"/>
+                <a:alpha val="50196"/>
+              </a:schemeClr>
+            </a:solidFill>
+            <a:ln>
+              <a:noFill/>
+            </a:ln>
+          </p:spPr>
+          <p:style>
+            <a:lnRef idx="2">
+              <a:schemeClr val="accent1">
+                <a:shade val="50000"/>
+              </a:schemeClr>
+            </a:lnRef>
+            <a:fillRef idx="1">
+              <a:schemeClr val="accent1"/>
+            </a:fillRef>
+            <a:effectRef idx="0">
+              <a:schemeClr val="accent1"/>
+            </a:effectRef>
+            <a:fontRef idx="minor">
+              <a:schemeClr val="lt1"/>
+            </a:fontRef>
+          </p:style>
+          <p:txBody>
+            <a:bodyPr rtlCol="0" anchor="ctr"/>
+            <a:lstStyle/>
+            <a:p>
+              <a:pPr algn="ctr"/>
+              <a:endParaRPr lang="fr-CH">
+                <a:solidFill>
+                  <a:schemeClr val="tx1"/>
+                </a:solidFill>
+              </a:endParaRPr>
+            </a:p>
+          </p:txBody>
+        </p:sp>
+      </p:grpSp>
     </p:spTree>
     <p:extLst>
       <p:ext uri="{BB962C8B-B14F-4D97-AF65-F5344CB8AC3E}">

</xml_diff>